<commit_message>
updated development process slide
</commit_message>
<xml_diff>
--- a/Documents/project_proposal.pptx
+++ b/Documents/project_proposal.pptx
@@ -121,6 +121,7 @@
   <p1510:revLst>
     <p1510:client id="{6D9A2202-AD4B-4406-BC56-4D5AD439A86A}" v="2008" dt="2018-09-15T21:12:50.518"/>
     <p1510:client id="{9C856D55-EB98-4056-9488-EAC55D958609}" v="34" dt="2018-09-15T21:28:43.262"/>
+    <p1510:client id="{17C5753B-AC8D-4301-833B-318A7E610C0A}" v="20" dt="2018-09-15T22:10:32.387"/>
   </p1510:revLst>
 </p1510:revInfo>
 </file>
@@ -562,6 +563,30 @@
     </pc:docChg>
   </pc:docChgLst>
   <pc:docChgLst>
+    <pc:chgData name="Horia Petre" userId="a27f21c445ea404d" providerId="LiveId" clId="{17C5753B-AC8D-4301-833B-318A7E610C0A}"/>
+    <pc:docChg chg="modSld">
+      <pc:chgData name="Horia Petre" userId="a27f21c445ea404d" providerId="LiveId" clId="{17C5753B-AC8D-4301-833B-318A7E610C0A}" dt="2018-09-15T22:10:32.387" v="19" actId="20577"/>
+      <pc:docMkLst>
+        <pc:docMk/>
+      </pc:docMkLst>
+      <pc:sldChg chg="modSp">
+        <pc:chgData name="Horia Petre" userId="a27f21c445ea404d" providerId="LiveId" clId="{17C5753B-AC8D-4301-833B-318A7E610C0A}" dt="2018-09-15T22:10:32.387" v="19" actId="20577"/>
+        <pc:sldMkLst>
+          <pc:docMk/>
+          <pc:sldMk cId="3021129812" sldId="260"/>
+        </pc:sldMkLst>
+        <pc:spChg chg="mod">
+          <ac:chgData name="Horia Petre" userId="a27f21c445ea404d" providerId="LiveId" clId="{17C5753B-AC8D-4301-833B-318A7E610C0A}" dt="2018-09-15T22:10:32.387" v="19" actId="20577"/>
+          <ac:spMkLst>
+            <pc:docMk/>
+            <pc:sldMk cId="3021129812" sldId="260"/>
+            <ac:spMk id="3" creationId="{099E0219-DBCA-44CA-9652-DCDC4AB9457B}"/>
+          </ac:spMkLst>
+        </pc:spChg>
+      </pc:sldChg>
+    </pc:docChg>
+  </pc:docChgLst>
+  <pc:docChgLst>
     <pc:chgData name="Horia Petre" userId="a27f21c445ea404d" providerId="LiveId" clId="{9C856D55-EB98-4056-9488-EAC55D958609}"/>
     <pc:docChg chg="custSel addSld modSld">
       <pc:chgData name="Horia Petre" userId="a27f21c445ea404d" providerId="LiveId" clId="{9C856D55-EB98-4056-9488-EAC55D958609}" dt="2018-09-15T21:28:43.262" v="33" actId="20577"/>
@@ -5484,7 +5509,10 @@
           <a:bodyPr/>
           <a:lstStyle/>
           <a:p>
-            <a:endParaRPr lang="en-CA"/>
+            <a:r>
+              <a:rPr lang="en-CA" dirty="0"/>
+              <a:t>Requirement Analysis</a:t>
+            </a:r>
           </a:p>
         </p:txBody>
       </p:sp>

</xml_diff>

<commit_message>
added slide for the preliminary component list
</commit_message>
<xml_diff>
--- a/Documents/project_proposal.pptx
+++ b/Documents/project_proposal.pptx
@@ -119,9 +119,7 @@
 <file path=ppt/revisionInfo.xml><?xml version="1.0" encoding="utf-8"?>
 <p1510:revInfo xmlns:a="http://schemas.openxmlformats.org/drawingml/2006/main" xmlns:r="http://schemas.openxmlformats.org/officeDocument/2006/relationships" xmlns:p1510="http://schemas.microsoft.com/office/powerpoint/2015/10/main">
   <p1510:revLst>
-    <p1510:client id="{6D9A2202-AD4B-4406-BC56-4D5AD439A86A}" v="2008" dt="2018-09-15T21:12:50.518"/>
-    <p1510:client id="{9C856D55-EB98-4056-9488-EAC55D958609}" v="34" dt="2018-09-15T21:28:43.262"/>
-    <p1510:client id="{17C5753B-AC8D-4301-833B-318A7E610C0A}" v="20" dt="2018-09-15T22:10:32.387"/>
+    <p1510:client id="{17C5753B-AC8D-4301-833B-318A7E610C0A}" v="217" dt="2018-09-17T12:02:42.316"/>
   </p1510:revLst>
 </p1510:revInfo>
 </file>
@@ -250,28 +248,6 @@
             <pc:docMk/>
             <pc:sldMk cId="524301195" sldId="257"/>
             <ac:spMk id="3" creationId="{7BF294F7-009C-49C8-B0B5-0A8E6EA8BD53}"/>
-          </ac:spMkLst>
-        </pc:spChg>
-      </pc:sldChg>
-      <pc:sldChg chg="add del setBg">
-        <pc:chgData name="Horia Petre" userId="a27f21c445ea404d" providerId="LiveId" clId="{6D9A2202-AD4B-4406-BC56-4D5AD439A86A}" dt="2018-09-15T19:43:24.056" v="729" actId="2696"/>
-        <pc:sldMkLst>
-          <pc:docMk/>
-          <pc:sldMk cId="1912177603" sldId="257"/>
-        </pc:sldMkLst>
-      </pc:sldChg>
-      <pc:sldChg chg="modSp add del setBg">
-        <pc:chgData name="Horia Petre" userId="a27f21c445ea404d" providerId="LiveId" clId="{6D9A2202-AD4B-4406-BC56-4D5AD439A86A}" dt="2018-09-15T19:40:55.251" v="346" actId="2696"/>
-        <pc:sldMkLst>
-          <pc:docMk/>
-          <pc:sldMk cId="4240180043" sldId="257"/>
-        </pc:sldMkLst>
-        <pc:spChg chg="mod">
-          <ac:chgData name="Horia Petre" userId="a27f21c445ea404d" providerId="LiveId" clId="{6D9A2202-AD4B-4406-BC56-4D5AD439A86A}" dt="2018-09-15T19:39:46.339" v="279" actId="1076"/>
-          <ac:spMkLst>
-            <pc:docMk/>
-            <pc:sldMk cId="4240180043" sldId="257"/>
-            <ac:spMk id="2" creationId="{AA7CDA7C-2980-4944-BCAC-336A5D996F88}"/>
           </ac:spMkLst>
         </pc:spChg>
       </pc:sldChg>
@@ -465,124 +441,60 @@
           </ac:cxnSpMkLst>
         </pc:cxnChg>
       </pc:sldChg>
-      <pc:sldMasterChg chg="setBg modSldLayout">
-        <pc:chgData name="Horia Petre" userId="a27f21c445ea404d" providerId="LiveId" clId="{6D9A2202-AD4B-4406-BC56-4D5AD439A86A}" dt="2018-09-15T19:38:13.371" v="272"/>
-        <pc:sldMasterMkLst>
-          <pc:docMk/>
-          <pc:sldMasterMk cId="443017092" sldId="2147483648"/>
-        </pc:sldMasterMkLst>
-        <pc:sldLayoutChg chg="setBg">
-          <pc:chgData name="Horia Petre" userId="a27f21c445ea404d" providerId="LiveId" clId="{6D9A2202-AD4B-4406-BC56-4D5AD439A86A}" dt="2018-09-15T19:38:13.371" v="272"/>
-          <pc:sldLayoutMkLst>
-            <pc:docMk/>
-            <pc:sldMasterMk cId="443017092" sldId="2147483648"/>
-            <pc:sldLayoutMk cId="3078580815" sldId="2147483649"/>
-          </pc:sldLayoutMkLst>
-        </pc:sldLayoutChg>
-        <pc:sldLayoutChg chg="setBg">
-          <pc:chgData name="Horia Petre" userId="a27f21c445ea404d" providerId="LiveId" clId="{6D9A2202-AD4B-4406-BC56-4D5AD439A86A}" dt="2018-09-15T19:38:13.371" v="272"/>
-          <pc:sldLayoutMkLst>
-            <pc:docMk/>
-            <pc:sldMasterMk cId="443017092" sldId="2147483648"/>
-            <pc:sldLayoutMk cId="2298886169" sldId="2147483650"/>
-          </pc:sldLayoutMkLst>
-        </pc:sldLayoutChg>
-        <pc:sldLayoutChg chg="setBg">
-          <pc:chgData name="Horia Petre" userId="a27f21c445ea404d" providerId="LiveId" clId="{6D9A2202-AD4B-4406-BC56-4D5AD439A86A}" dt="2018-09-15T19:38:13.371" v="272"/>
-          <pc:sldLayoutMkLst>
-            <pc:docMk/>
-            <pc:sldMasterMk cId="443017092" sldId="2147483648"/>
-            <pc:sldLayoutMk cId="4108085031" sldId="2147483651"/>
-          </pc:sldLayoutMkLst>
-        </pc:sldLayoutChg>
-        <pc:sldLayoutChg chg="setBg">
-          <pc:chgData name="Horia Petre" userId="a27f21c445ea404d" providerId="LiveId" clId="{6D9A2202-AD4B-4406-BC56-4D5AD439A86A}" dt="2018-09-15T19:38:13.371" v="272"/>
-          <pc:sldLayoutMkLst>
-            <pc:docMk/>
-            <pc:sldMasterMk cId="443017092" sldId="2147483648"/>
-            <pc:sldLayoutMk cId="92983095" sldId="2147483652"/>
-          </pc:sldLayoutMkLst>
-        </pc:sldLayoutChg>
-        <pc:sldLayoutChg chg="setBg">
-          <pc:chgData name="Horia Petre" userId="a27f21c445ea404d" providerId="LiveId" clId="{6D9A2202-AD4B-4406-BC56-4D5AD439A86A}" dt="2018-09-15T19:38:13.371" v="272"/>
-          <pc:sldLayoutMkLst>
-            <pc:docMk/>
-            <pc:sldMasterMk cId="443017092" sldId="2147483648"/>
-            <pc:sldLayoutMk cId="563675920" sldId="2147483653"/>
-          </pc:sldLayoutMkLst>
-        </pc:sldLayoutChg>
-        <pc:sldLayoutChg chg="setBg">
-          <pc:chgData name="Horia Petre" userId="a27f21c445ea404d" providerId="LiveId" clId="{6D9A2202-AD4B-4406-BC56-4D5AD439A86A}" dt="2018-09-15T19:38:13.371" v="272"/>
-          <pc:sldLayoutMkLst>
-            <pc:docMk/>
-            <pc:sldMasterMk cId="443017092" sldId="2147483648"/>
-            <pc:sldLayoutMk cId="3520480807" sldId="2147483654"/>
-          </pc:sldLayoutMkLst>
-        </pc:sldLayoutChg>
-        <pc:sldLayoutChg chg="setBg">
-          <pc:chgData name="Horia Petre" userId="a27f21c445ea404d" providerId="LiveId" clId="{6D9A2202-AD4B-4406-BC56-4D5AD439A86A}" dt="2018-09-15T19:38:13.371" v="272"/>
-          <pc:sldLayoutMkLst>
-            <pc:docMk/>
-            <pc:sldMasterMk cId="443017092" sldId="2147483648"/>
-            <pc:sldLayoutMk cId="1615403987" sldId="2147483655"/>
-          </pc:sldLayoutMkLst>
-        </pc:sldLayoutChg>
-        <pc:sldLayoutChg chg="setBg">
-          <pc:chgData name="Horia Petre" userId="a27f21c445ea404d" providerId="LiveId" clId="{6D9A2202-AD4B-4406-BC56-4D5AD439A86A}" dt="2018-09-15T19:38:13.371" v="272"/>
-          <pc:sldLayoutMkLst>
-            <pc:docMk/>
-            <pc:sldMasterMk cId="443017092" sldId="2147483648"/>
-            <pc:sldLayoutMk cId="2337966698" sldId="2147483656"/>
-          </pc:sldLayoutMkLst>
-        </pc:sldLayoutChg>
-        <pc:sldLayoutChg chg="setBg">
-          <pc:chgData name="Horia Petre" userId="a27f21c445ea404d" providerId="LiveId" clId="{6D9A2202-AD4B-4406-BC56-4D5AD439A86A}" dt="2018-09-15T19:38:13.371" v="272"/>
-          <pc:sldLayoutMkLst>
-            <pc:docMk/>
-            <pc:sldMasterMk cId="443017092" sldId="2147483648"/>
-            <pc:sldLayoutMk cId="1716380763" sldId="2147483657"/>
-          </pc:sldLayoutMkLst>
-        </pc:sldLayoutChg>
-        <pc:sldLayoutChg chg="setBg">
-          <pc:chgData name="Horia Petre" userId="a27f21c445ea404d" providerId="LiveId" clId="{6D9A2202-AD4B-4406-BC56-4D5AD439A86A}" dt="2018-09-15T19:38:13.371" v="272"/>
-          <pc:sldLayoutMkLst>
-            <pc:docMk/>
-            <pc:sldMasterMk cId="443017092" sldId="2147483648"/>
-            <pc:sldLayoutMk cId="2147120456" sldId="2147483658"/>
-          </pc:sldLayoutMkLst>
-        </pc:sldLayoutChg>
-        <pc:sldLayoutChg chg="setBg">
-          <pc:chgData name="Horia Petre" userId="a27f21c445ea404d" providerId="LiveId" clId="{6D9A2202-AD4B-4406-BC56-4D5AD439A86A}" dt="2018-09-15T19:38:13.371" v="272"/>
-          <pc:sldLayoutMkLst>
-            <pc:docMk/>
-            <pc:sldMasterMk cId="443017092" sldId="2147483648"/>
-            <pc:sldLayoutMk cId="2678381138" sldId="2147483659"/>
-          </pc:sldLayoutMkLst>
-        </pc:sldLayoutChg>
-      </pc:sldMasterChg>
     </pc:docChg>
   </pc:docChgLst>
   <pc:docChgLst>
     <pc:chgData name="Horia Petre" userId="a27f21c445ea404d" providerId="LiveId" clId="{17C5753B-AC8D-4301-833B-318A7E610C0A}"/>
-    <pc:docChg chg="modSld">
-      <pc:chgData name="Horia Petre" userId="a27f21c445ea404d" providerId="LiveId" clId="{17C5753B-AC8D-4301-833B-318A7E610C0A}" dt="2018-09-15T22:10:32.387" v="19" actId="20577"/>
+    <pc:docChg chg="custSel modSld">
+      <pc:chgData name="Horia Petre" userId="a27f21c445ea404d" providerId="LiveId" clId="{17C5753B-AC8D-4301-833B-318A7E610C0A}" dt="2018-09-17T12:02:42.316" v="216" actId="20577"/>
       <pc:docMkLst>
         <pc:docMk/>
       </pc:docMkLst>
       <pc:sldChg chg="modSp">
-        <pc:chgData name="Horia Petre" userId="a27f21c445ea404d" providerId="LiveId" clId="{17C5753B-AC8D-4301-833B-318A7E610C0A}" dt="2018-09-15T22:10:32.387" v="19" actId="20577"/>
+        <pc:chgData name="Horia Petre" userId="a27f21c445ea404d" providerId="LiveId" clId="{17C5753B-AC8D-4301-833B-318A7E610C0A}" dt="2018-09-17T11:48:17.343" v="23" actId="20577"/>
+        <pc:sldMkLst>
+          <pc:docMk/>
+          <pc:sldMk cId="524301195" sldId="257"/>
+        </pc:sldMkLst>
+        <pc:spChg chg="mod">
+          <ac:chgData name="Horia Petre" userId="a27f21c445ea404d" providerId="LiveId" clId="{17C5753B-AC8D-4301-833B-318A7E610C0A}" dt="2018-09-17T11:48:17.343" v="23" actId="20577"/>
+          <ac:spMkLst>
+            <pc:docMk/>
+            <pc:sldMk cId="524301195" sldId="257"/>
+            <ac:spMk id="3" creationId="{7BF294F7-009C-49C8-B0B5-0A8E6EA8BD53}"/>
+          </ac:spMkLst>
+        </pc:spChg>
+      </pc:sldChg>
+      <pc:sldChg chg="addSp delSp modSp">
+        <pc:chgData name="Horia Petre" userId="a27f21c445ea404d" providerId="LiveId" clId="{17C5753B-AC8D-4301-833B-318A7E610C0A}" dt="2018-09-17T12:02:42.316" v="216" actId="20577"/>
         <pc:sldMkLst>
           <pc:docMk/>
           <pc:sldMk cId="3021129812" sldId="260"/>
         </pc:sldMkLst>
         <pc:spChg chg="mod">
-          <ac:chgData name="Horia Petre" userId="a27f21c445ea404d" providerId="LiveId" clId="{17C5753B-AC8D-4301-833B-318A7E610C0A}" dt="2018-09-15T22:10:32.387" v="19" actId="20577"/>
+          <ac:chgData name="Horia Petre" userId="a27f21c445ea404d" providerId="LiveId" clId="{17C5753B-AC8D-4301-833B-318A7E610C0A}" dt="2018-09-17T11:48:53.775" v="78" actId="20577"/>
+          <ac:spMkLst>
+            <pc:docMk/>
+            <pc:sldMk cId="3021129812" sldId="260"/>
+            <ac:spMk id="2" creationId="{7F3EC2B6-0A04-4124-A479-2744ED040532}"/>
+          </ac:spMkLst>
+        </pc:spChg>
+        <pc:spChg chg="del mod">
+          <ac:chgData name="Horia Petre" userId="a27f21c445ea404d" providerId="LiveId" clId="{17C5753B-AC8D-4301-833B-318A7E610C0A}" dt="2018-09-17T11:49:56.976" v="79" actId="3680"/>
           <ac:spMkLst>
             <pc:docMk/>
             <pc:sldMk cId="3021129812" sldId="260"/>
             <ac:spMk id="3" creationId="{099E0219-DBCA-44CA-9652-DCDC4AB9457B}"/>
           </ac:spMkLst>
         </pc:spChg>
+        <pc:graphicFrameChg chg="add mod modGraphic">
+          <ac:chgData name="Horia Petre" userId="a27f21c445ea404d" providerId="LiveId" clId="{17C5753B-AC8D-4301-833B-318A7E610C0A}" dt="2018-09-17T12:02:42.316" v="216" actId="20577"/>
+          <ac:graphicFrameMkLst>
+            <pc:docMk/>
+            <pc:sldMk cId="3021129812" sldId="260"/>
+            <ac:graphicFrameMk id="4" creationId="{6E31991E-B8DC-4A12-BDE0-D8BF1A2CCC9C}"/>
+          </ac:graphicFrameMkLst>
+        </pc:graphicFrameChg>
       </pc:sldChg>
     </pc:docChg>
   </pc:docChgLst>
@@ -777,7 +689,7 @@
           <a:p>
             <a:fld id="{03C4E9D7-646C-496D-887C-29F418E352D9}" type="datetimeFigureOut">
               <a:rPr lang="en-CA" smtClean="0"/>
-              <a:t>2018-09-15</a:t>
+              <a:t>2018-09-17</a:t>
             </a:fld>
             <a:endParaRPr lang="en-CA"/>
           </a:p>
@@ -977,7 +889,7 @@
           <a:p>
             <a:fld id="{03C4E9D7-646C-496D-887C-29F418E352D9}" type="datetimeFigureOut">
               <a:rPr lang="en-CA" smtClean="0"/>
-              <a:t>2018-09-15</a:t>
+              <a:t>2018-09-17</a:t>
             </a:fld>
             <a:endParaRPr lang="en-CA"/>
           </a:p>
@@ -1187,7 +1099,7 @@
           <a:p>
             <a:fld id="{03C4E9D7-646C-496D-887C-29F418E352D9}" type="datetimeFigureOut">
               <a:rPr lang="en-CA" smtClean="0"/>
-              <a:t>2018-09-15</a:t>
+              <a:t>2018-09-17</a:t>
             </a:fld>
             <a:endParaRPr lang="en-CA"/>
           </a:p>
@@ -1387,7 +1299,7 @@
           <a:p>
             <a:fld id="{03C4E9D7-646C-496D-887C-29F418E352D9}" type="datetimeFigureOut">
               <a:rPr lang="en-CA" smtClean="0"/>
-              <a:t>2018-09-15</a:t>
+              <a:t>2018-09-17</a:t>
             </a:fld>
             <a:endParaRPr lang="en-CA"/>
           </a:p>
@@ -1663,7 +1575,7 @@
           <a:p>
             <a:fld id="{03C4E9D7-646C-496D-887C-29F418E352D9}" type="datetimeFigureOut">
               <a:rPr lang="en-CA" smtClean="0"/>
-              <a:t>2018-09-15</a:t>
+              <a:t>2018-09-17</a:t>
             </a:fld>
             <a:endParaRPr lang="en-CA"/>
           </a:p>
@@ -1931,7 +1843,7 @@
           <a:p>
             <a:fld id="{03C4E9D7-646C-496D-887C-29F418E352D9}" type="datetimeFigureOut">
               <a:rPr lang="en-CA" smtClean="0"/>
-              <a:t>2018-09-15</a:t>
+              <a:t>2018-09-17</a:t>
             </a:fld>
             <a:endParaRPr lang="en-CA"/>
           </a:p>
@@ -2346,7 +2258,7 @@
           <a:p>
             <a:fld id="{03C4E9D7-646C-496D-887C-29F418E352D9}" type="datetimeFigureOut">
               <a:rPr lang="en-CA" smtClean="0"/>
-              <a:t>2018-09-15</a:t>
+              <a:t>2018-09-17</a:t>
             </a:fld>
             <a:endParaRPr lang="en-CA"/>
           </a:p>
@@ -2488,7 +2400,7 @@
           <a:p>
             <a:fld id="{03C4E9D7-646C-496D-887C-29F418E352D9}" type="datetimeFigureOut">
               <a:rPr lang="en-CA" smtClean="0"/>
-              <a:t>2018-09-15</a:t>
+              <a:t>2018-09-17</a:t>
             </a:fld>
             <a:endParaRPr lang="en-CA"/>
           </a:p>
@@ -2601,7 +2513,7 @@
           <a:p>
             <a:fld id="{03C4E9D7-646C-496D-887C-29F418E352D9}" type="datetimeFigureOut">
               <a:rPr lang="en-CA" smtClean="0"/>
-              <a:t>2018-09-15</a:t>
+              <a:t>2018-09-17</a:t>
             </a:fld>
             <a:endParaRPr lang="en-CA"/>
           </a:p>
@@ -2914,7 +2826,7 @@
           <a:p>
             <a:fld id="{03C4E9D7-646C-496D-887C-29F418E352D9}" type="datetimeFigureOut">
               <a:rPr lang="en-CA" smtClean="0"/>
-              <a:t>2018-09-15</a:t>
+              <a:t>2018-09-17</a:t>
             </a:fld>
             <a:endParaRPr lang="en-CA"/>
           </a:p>
@@ -3203,7 +3115,7 @@
           <a:p>
             <a:fld id="{03C4E9D7-646C-496D-887C-29F418E352D9}" type="datetimeFigureOut">
               <a:rPr lang="en-CA" smtClean="0"/>
-              <a:t>2018-09-15</a:t>
+              <a:t>2018-09-17</a:t>
             </a:fld>
             <a:endParaRPr lang="en-CA"/>
           </a:p>
@@ -3446,7 +3358,7 @@
           <a:p>
             <a:fld id="{03C4E9D7-646C-496D-887C-29F418E352D9}" type="datetimeFigureOut">
               <a:rPr lang="en-CA" smtClean="0"/>
-              <a:t>2018-09-15</a:t>
+              <a:t>2018-09-17</a:t>
             </a:fld>
             <a:endParaRPr lang="en-CA"/>
           </a:p>
@@ -4382,7 +4294,7 @@
         <p:spPr/>
         <p:txBody>
           <a:bodyPr>
-            <a:normAutofit lnSpcReduction="10000"/>
+            <a:normAutofit/>
           </a:bodyPr>
           <a:lstStyle/>
           <a:p>
@@ -4413,26 +4325,8 @@
             </a:r>
           </a:p>
           <a:p>
-            <a:pPr>
-              <a:buFont typeface="Wingdings" panose="05000000000000000000" pitchFamily="2" charset="2"/>
-              <a:buChar char="Ø"/>
-            </a:pPr>
-            <a:endParaRPr lang="en-CA" dirty="0"/>
-          </a:p>
-          <a:p>
-            <a:pPr>
-              <a:buFont typeface="Wingdings" panose="05000000000000000000" pitchFamily="2" charset="2"/>
-              <a:buChar char="Ø"/>
-            </a:pPr>
-            <a:r>
-              <a:rPr lang="en-CA" dirty="0"/>
-              <a:t>Development Process</a:t>
-            </a:r>
-          </a:p>
-          <a:p>
-            <a:pPr>
-              <a:buFont typeface="Wingdings" panose="05000000000000000000" pitchFamily="2" charset="2"/>
-              <a:buChar char="Ø"/>
+            <a:pPr marL="0" indent="0">
+              <a:buNone/>
             </a:pPr>
             <a:endParaRPr lang="en-CA" dirty="0"/>
           </a:p>
@@ -5483,39 +5377,356 @@
           <a:p>
             <a:r>
               <a:rPr lang="en-CA" dirty="0"/>
-              <a:t>Development Process</a:t>
-            </a:r>
-          </a:p>
-        </p:txBody>
-      </p:sp>
-      <p:sp>
-        <p:nvSpPr>
-          <p:cNvPr id="3" name="Content Placeholder 2">
-            <a:extLst>
-              <a:ext uri="{FF2B5EF4-FFF2-40B4-BE49-F238E27FC236}">
-                <a16:creationId xmlns:a16="http://schemas.microsoft.com/office/drawing/2014/main" id="{099E0219-DBCA-44CA-9652-DCDC4AB9457B}"/>
-              </a:ext>
-            </a:extLst>
-          </p:cNvPr>
-          <p:cNvSpPr>
-            <a:spLocks noGrp="1"/>
-          </p:cNvSpPr>
+              <a:t>Preliminary component list &amp; price</a:t>
+            </a:r>
+          </a:p>
+        </p:txBody>
+      </p:sp>
+      <p:graphicFrame>
+        <p:nvGraphicFramePr>
+          <p:cNvPr id="4" name="Content Placeholder 3">
+            <a:extLst>
+              <a:ext uri="{FF2B5EF4-FFF2-40B4-BE49-F238E27FC236}">
+                <a16:creationId xmlns:a16="http://schemas.microsoft.com/office/drawing/2014/main" id="{6E31991E-B8DC-4A12-BDE0-D8BF1A2CCC9C}"/>
+              </a:ext>
+            </a:extLst>
+          </p:cNvPr>
+          <p:cNvGraphicFramePr>
+            <a:graphicFrameLocks noGrp="1"/>
+          </p:cNvGraphicFramePr>
           <p:nvPr>
             <p:ph idx="1"/>
-          </p:nvPr>
-        </p:nvSpPr>
-        <p:spPr/>
-        <p:txBody>
-          <a:bodyPr/>
-          <a:lstStyle/>
-          <a:p>
-            <a:r>
-              <a:rPr lang="en-CA" dirty="0"/>
-              <a:t>Requirement Analysis</a:t>
-            </a:r>
-          </a:p>
-        </p:txBody>
-      </p:sp>
+            <p:extLst>
+              <p:ext uri="{D42A27DB-BD31-4B8C-83A1-F6EECF244321}">
+                <p14:modId xmlns:p14="http://schemas.microsoft.com/office/powerpoint/2010/main" val="1741628745"/>
+              </p:ext>
+            </p:extLst>
+          </p:nvPr>
+        </p:nvGraphicFramePr>
+        <p:xfrm>
+          <a:off x="941895" y="2042441"/>
+          <a:ext cx="10515600" cy="2225040"/>
+        </p:xfrm>
+        <a:graphic>
+          <a:graphicData uri="http://schemas.openxmlformats.org/drawingml/2006/table">
+            <a:tbl>
+              <a:tblPr firstRow="1" bandRow="1">
+                <a:tableStyleId>{5C22544A-7EE6-4342-B048-85BDC9FD1C3A}</a:tableStyleId>
+              </a:tblPr>
+              <a:tblGrid>
+                <a:gridCol w="7777899">
+                  <a:extLst>
+                    <a:ext uri="{9D8B030D-6E8A-4147-A177-3AD203B41FA5}">
+                      <a16:colId xmlns:a16="http://schemas.microsoft.com/office/drawing/2014/main" val="4046912109"/>
+                    </a:ext>
+                  </a:extLst>
+                </a:gridCol>
+                <a:gridCol w="1366886">
+                  <a:extLst>
+                    <a:ext uri="{9D8B030D-6E8A-4147-A177-3AD203B41FA5}">
+                      <a16:colId xmlns:a16="http://schemas.microsoft.com/office/drawing/2014/main" val="1151024473"/>
+                    </a:ext>
+                  </a:extLst>
+                </a:gridCol>
+                <a:gridCol w="1370815">
+                  <a:extLst>
+                    <a:ext uri="{9D8B030D-6E8A-4147-A177-3AD203B41FA5}">
+                      <a16:colId xmlns:a16="http://schemas.microsoft.com/office/drawing/2014/main" val="3014906328"/>
+                    </a:ext>
+                  </a:extLst>
+                </a:gridCol>
+              </a:tblGrid>
+              <a:tr h="370840">
+                <a:tc>
+                  <a:txBody>
+                    <a:bodyPr/>
+                    <a:lstStyle/>
+                    <a:p>
+                      <a:pPr algn="ctr"/>
+                      <a:r>
+                        <a:rPr lang="en-CA" dirty="0"/>
+                        <a:t>Component</a:t>
+                      </a:r>
+                    </a:p>
+                  </a:txBody>
+                  <a:tcPr/>
+                </a:tc>
+                <a:tc>
+                  <a:txBody>
+                    <a:bodyPr/>
+                    <a:lstStyle/>
+                    <a:p>
+                      <a:pPr algn="ctr"/>
+                      <a:r>
+                        <a:rPr lang="en-CA" dirty="0"/>
+                        <a:t>Quantity</a:t>
+                      </a:r>
+                    </a:p>
+                  </a:txBody>
+                  <a:tcPr/>
+                </a:tc>
+                <a:tc>
+                  <a:txBody>
+                    <a:bodyPr/>
+                    <a:lstStyle/>
+                    <a:p>
+                      <a:pPr algn="ctr"/>
+                      <a:r>
+                        <a:rPr lang="en-CA" dirty="0"/>
+                        <a:t>Price (CAD)</a:t>
+                      </a:r>
+                    </a:p>
+                  </a:txBody>
+                  <a:tcPr/>
+                </a:tc>
+                <a:extLst>
+                  <a:ext uri="{0D108BD9-81ED-4DB2-BD59-A6C34878D82A}">
+                    <a16:rowId xmlns:a16="http://schemas.microsoft.com/office/drawing/2014/main" val="2631097258"/>
+                  </a:ext>
+                </a:extLst>
+              </a:tr>
+              <a:tr h="370840">
+                <a:tc>
+                  <a:txBody>
+                    <a:bodyPr/>
+                    <a:lstStyle/>
+                    <a:p>
+                      <a:pPr algn="ctr"/>
+                      <a:r>
+                        <a:rPr lang="en-CA" dirty="0"/>
+                        <a:t>FRDM-KL25Z board</a:t>
+                      </a:r>
+                    </a:p>
+                  </a:txBody>
+                  <a:tcPr/>
+                </a:tc>
+                <a:tc>
+                  <a:txBody>
+                    <a:bodyPr/>
+                    <a:lstStyle/>
+                    <a:p>
+                      <a:pPr algn="ctr"/>
+                      <a:r>
+                        <a:rPr lang="en-CA" dirty="0"/>
+                        <a:t>1</a:t>
+                      </a:r>
+                    </a:p>
+                  </a:txBody>
+                  <a:tcPr/>
+                </a:tc>
+                <a:tc>
+                  <a:txBody>
+                    <a:bodyPr/>
+                    <a:lstStyle/>
+                    <a:p>
+                      <a:pPr algn="ctr"/>
+                      <a:r>
+                        <a:rPr lang="en-CA" dirty="0"/>
+                        <a:t>24</a:t>
+                      </a:r>
+                    </a:p>
+                  </a:txBody>
+                  <a:tcPr/>
+                </a:tc>
+                <a:extLst>
+                  <a:ext uri="{0D108BD9-81ED-4DB2-BD59-A6C34878D82A}">
+                    <a16:rowId xmlns:a16="http://schemas.microsoft.com/office/drawing/2014/main" val="2766113681"/>
+                  </a:ext>
+                </a:extLst>
+              </a:tr>
+              <a:tr h="370840">
+                <a:tc>
+                  <a:txBody>
+                    <a:bodyPr/>
+                    <a:lstStyle/>
+                    <a:p>
+                      <a:pPr algn="ctr"/>
+                      <a:r>
+                        <a:rPr lang="en-CA" dirty="0"/>
+                        <a:t>Ultrasonic sensor hc-sr04</a:t>
+                      </a:r>
+                    </a:p>
+                  </a:txBody>
+                  <a:tcPr/>
+                </a:tc>
+                <a:tc>
+                  <a:txBody>
+                    <a:bodyPr/>
+                    <a:lstStyle/>
+                    <a:p>
+                      <a:pPr algn="ctr"/>
+                      <a:r>
+                        <a:rPr lang="en-CA" dirty="0"/>
+                        <a:t>1</a:t>
+                      </a:r>
+                    </a:p>
+                  </a:txBody>
+                  <a:tcPr/>
+                </a:tc>
+                <a:tc>
+                  <a:txBody>
+                    <a:bodyPr/>
+                    <a:lstStyle/>
+                    <a:p>
+                      <a:pPr algn="ctr"/>
+                      <a:r>
+                        <a:rPr lang="en-CA" dirty="0"/>
+                        <a:t>4</a:t>
+                      </a:r>
+                    </a:p>
+                  </a:txBody>
+                  <a:tcPr/>
+                </a:tc>
+                <a:extLst>
+                  <a:ext uri="{0D108BD9-81ED-4DB2-BD59-A6C34878D82A}">
+                    <a16:rowId xmlns:a16="http://schemas.microsoft.com/office/drawing/2014/main" val="2293871748"/>
+                  </a:ext>
+                </a:extLst>
+              </a:tr>
+              <a:tr h="370840">
+                <a:tc>
+                  <a:txBody>
+                    <a:bodyPr/>
+                    <a:lstStyle/>
+                    <a:p>
+                      <a:pPr algn="ctr"/>
+                      <a:r>
+                        <a:rPr lang="en-CA" dirty="0"/>
+                        <a:t>Motor driver</a:t>
+                      </a:r>
+                    </a:p>
+                  </a:txBody>
+                  <a:tcPr/>
+                </a:tc>
+                <a:tc>
+                  <a:txBody>
+                    <a:bodyPr/>
+                    <a:lstStyle/>
+                    <a:p>
+                      <a:pPr algn="ctr"/>
+                      <a:r>
+                        <a:rPr lang="en-CA" dirty="0"/>
+                        <a:t>1</a:t>
+                      </a:r>
+                    </a:p>
+                  </a:txBody>
+                  <a:tcPr/>
+                </a:tc>
+                <a:tc>
+                  <a:txBody>
+                    <a:bodyPr/>
+                    <a:lstStyle/>
+                    <a:p>
+                      <a:pPr algn="ctr"/>
+                      <a:r>
+                        <a:rPr lang="en-CA" dirty="0"/>
+                        <a:t>4</a:t>
+                      </a:r>
+                    </a:p>
+                  </a:txBody>
+                  <a:tcPr/>
+                </a:tc>
+                <a:extLst>
+                  <a:ext uri="{0D108BD9-81ED-4DB2-BD59-A6C34878D82A}">
+                    <a16:rowId xmlns:a16="http://schemas.microsoft.com/office/drawing/2014/main" val="4081422025"/>
+                  </a:ext>
+                </a:extLst>
+              </a:tr>
+              <a:tr h="370840">
+                <a:tc>
+                  <a:txBody>
+                    <a:bodyPr/>
+                    <a:lstStyle/>
+                    <a:p>
+                      <a:pPr algn="ctr"/>
+                      <a:r>
+                        <a:rPr lang="en-CA" dirty="0"/>
+                        <a:t>Self Balancing robot kit</a:t>
+                      </a:r>
+                    </a:p>
+                  </a:txBody>
+                  <a:tcPr/>
+                </a:tc>
+                <a:tc>
+                  <a:txBody>
+                    <a:bodyPr/>
+                    <a:lstStyle/>
+                    <a:p>
+                      <a:pPr algn="ctr"/>
+                      <a:r>
+                        <a:rPr lang="en-CA" dirty="0"/>
+                        <a:t>1</a:t>
+                      </a:r>
+                    </a:p>
+                  </a:txBody>
+                  <a:tcPr/>
+                </a:tc>
+                <a:tc>
+                  <a:txBody>
+                    <a:bodyPr/>
+                    <a:lstStyle/>
+                    <a:p>
+                      <a:pPr algn="ctr"/>
+                      <a:r>
+                        <a:rPr lang="en-CA" dirty="0"/>
+                        <a:t>40</a:t>
+                      </a:r>
+                    </a:p>
+                  </a:txBody>
+                  <a:tcPr/>
+                </a:tc>
+                <a:extLst>
+                  <a:ext uri="{0D108BD9-81ED-4DB2-BD59-A6C34878D82A}">
+                    <a16:rowId xmlns:a16="http://schemas.microsoft.com/office/drawing/2014/main" val="2911703347"/>
+                  </a:ext>
+                </a:extLst>
+              </a:tr>
+              <a:tr h="370840">
+                <a:tc>
+                  <a:txBody>
+                    <a:bodyPr/>
+                    <a:lstStyle/>
+                    <a:p>
+                      <a:pPr algn="ctr"/>
+                      <a:endParaRPr lang="en-CA" dirty="0"/>
+                    </a:p>
+                  </a:txBody>
+                  <a:tcPr/>
+                </a:tc>
+                <a:tc>
+                  <a:txBody>
+                    <a:bodyPr/>
+                    <a:lstStyle/>
+                    <a:p>
+                      <a:endParaRPr lang="en-CA"/>
+                    </a:p>
+                  </a:txBody>
+                  <a:tcPr/>
+                </a:tc>
+                <a:tc>
+                  <a:txBody>
+                    <a:bodyPr/>
+                    <a:lstStyle/>
+                    <a:p>
+                      <a:pPr algn="ctr"/>
+                      <a:r>
+                        <a:rPr lang="en-CA" dirty="0"/>
+                        <a:t>72</a:t>
+                      </a:r>
+                    </a:p>
+                  </a:txBody>
+                  <a:tcPr/>
+                </a:tc>
+                <a:extLst>
+                  <a:ext uri="{0D108BD9-81ED-4DB2-BD59-A6C34878D82A}">
+                    <a16:rowId xmlns:a16="http://schemas.microsoft.com/office/drawing/2014/main" val="400622520"/>
+                  </a:ext>
+                </a:extLst>
+              </a:tr>
+            </a:tbl>
+          </a:graphicData>
+        </a:graphic>
+      </p:graphicFrame>
     </p:spTree>
     <p:extLst>
       <p:ext uri="{BB962C8B-B14F-4D97-AF65-F5344CB8AC3E}">

</xml_diff>

<commit_message>
added slide for schedule and tasks and modified items list
</commit_message>
<xml_diff>
--- a/Documents/project_proposal.pptx
+++ b/Documents/project_proposal.pptx
@@ -10,6 +10,7 @@
     <p:sldId id="258" r:id="rId4"/>
     <p:sldId id="259" r:id="rId5"/>
     <p:sldId id="260" r:id="rId6"/>
+    <p:sldId id="261" r:id="rId7"/>
   </p:sldIdLst>
   <p:sldSz cx="12192000" cy="6858000"/>
   <p:notesSz cx="6858000" cy="9144000"/>
@@ -119,7 +120,7 @@
 <file path=ppt/revisionInfo.xml><?xml version="1.0" encoding="utf-8"?>
 <p1510:revInfo xmlns:a="http://schemas.openxmlformats.org/drawingml/2006/main" xmlns:r="http://schemas.openxmlformats.org/officeDocument/2006/relationships" xmlns:p1510="http://schemas.microsoft.com/office/powerpoint/2015/10/main">
   <p1510:revLst>
-    <p1510:client id="{17C5753B-AC8D-4301-833B-318A7E610C0A}" v="217" dt="2018-09-17T12:02:42.316"/>
+    <p1510:client id="{17C5753B-AC8D-4301-833B-318A7E610C0A}" v="260" dt="2018-09-17T12:09:31.369"/>
   </p1510:revLst>
 </p1510:revInfo>
 </file>
@@ -445,8 +446,8 @@
   </pc:docChgLst>
   <pc:docChgLst>
     <pc:chgData name="Horia Petre" userId="a27f21c445ea404d" providerId="LiveId" clId="{17C5753B-AC8D-4301-833B-318A7E610C0A}"/>
-    <pc:docChg chg="custSel modSld">
-      <pc:chgData name="Horia Petre" userId="a27f21c445ea404d" providerId="LiveId" clId="{17C5753B-AC8D-4301-833B-318A7E610C0A}" dt="2018-09-17T12:02:42.316" v="216" actId="20577"/>
+    <pc:docChg chg="custSel addSld modSld">
+      <pc:chgData name="Horia Petre" userId="a27f21c445ea404d" providerId="LiveId" clId="{17C5753B-AC8D-4301-833B-318A7E610C0A}" dt="2018-09-17T12:09:31.369" v="259" actId="1076"/>
       <pc:docMkLst>
         <pc:docMk/>
       </pc:docMkLst>
@@ -466,7 +467,7 @@
         </pc:spChg>
       </pc:sldChg>
       <pc:sldChg chg="addSp delSp modSp">
-        <pc:chgData name="Horia Petre" userId="a27f21c445ea404d" providerId="LiveId" clId="{17C5753B-AC8D-4301-833B-318A7E610C0A}" dt="2018-09-17T12:02:42.316" v="216" actId="20577"/>
+        <pc:chgData name="Horia Petre" userId="a27f21c445ea404d" providerId="LiveId" clId="{17C5753B-AC8D-4301-833B-318A7E610C0A}" dt="2018-09-17T12:09:31.369" v="259" actId="1076"/>
         <pc:sldMkLst>
           <pc:docMk/>
           <pc:sldMk cId="3021129812" sldId="260"/>
@@ -487,14 +488,37 @@
             <ac:spMk id="3" creationId="{099E0219-DBCA-44CA-9652-DCDC4AB9457B}"/>
           </ac:spMkLst>
         </pc:spChg>
+        <pc:spChg chg="add mod">
+          <ac:chgData name="Horia Petre" userId="a27f21c445ea404d" providerId="LiveId" clId="{17C5753B-AC8D-4301-833B-318A7E610C0A}" dt="2018-09-17T12:09:31.369" v="259" actId="1076"/>
+          <ac:spMkLst>
+            <pc:docMk/>
+            <pc:sldMk cId="3021129812" sldId="260"/>
+            <ac:spMk id="3" creationId="{F33F7695-69E5-4A50-A901-606213160E88}"/>
+          </ac:spMkLst>
+        </pc:spChg>
         <pc:graphicFrameChg chg="add mod modGraphic">
-          <ac:chgData name="Horia Petre" userId="a27f21c445ea404d" providerId="LiveId" clId="{17C5753B-AC8D-4301-833B-318A7E610C0A}" dt="2018-09-17T12:02:42.316" v="216" actId="20577"/>
+          <ac:chgData name="Horia Petre" userId="a27f21c445ea404d" providerId="LiveId" clId="{17C5753B-AC8D-4301-833B-318A7E610C0A}" dt="2018-09-17T12:08:23.527" v="244" actId="20577"/>
           <ac:graphicFrameMkLst>
             <pc:docMk/>
             <pc:sldMk cId="3021129812" sldId="260"/>
             <ac:graphicFrameMk id="4" creationId="{6E31991E-B8DC-4A12-BDE0-D8BF1A2CCC9C}"/>
           </ac:graphicFrameMkLst>
         </pc:graphicFrameChg>
+      </pc:sldChg>
+      <pc:sldChg chg="modSp add">
+        <pc:chgData name="Horia Petre" userId="a27f21c445ea404d" providerId="LiveId" clId="{17C5753B-AC8D-4301-833B-318A7E610C0A}" dt="2018-09-17T12:05:41.912" v="233" actId="20577"/>
+        <pc:sldMkLst>
+          <pc:docMk/>
+          <pc:sldMk cId="1788322995" sldId="261"/>
+        </pc:sldMkLst>
+        <pc:spChg chg="mod">
+          <ac:chgData name="Horia Petre" userId="a27f21c445ea404d" providerId="LiveId" clId="{17C5753B-AC8D-4301-833B-318A7E610C0A}" dt="2018-09-17T12:05:41.912" v="233" actId="20577"/>
+          <ac:spMkLst>
+            <pc:docMk/>
+            <pc:sldMk cId="1788322995" sldId="261"/>
+            <ac:spMk id="2" creationId="{29C0DEC7-62A0-464A-8E29-9B78948187C0}"/>
+          </ac:spMkLst>
+        </pc:spChg>
       </pc:sldChg>
     </pc:docChg>
   </pc:docChgLst>
@@ -5398,7 +5422,7 @@
             <p:ph idx="1"/>
             <p:extLst>
               <p:ext uri="{D42A27DB-BD31-4B8C-83A1-F6EECF244321}">
-                <p14:modId xmlns:p14="http://schemas.microsoft.com/office/powerpoint/2010/main" val="1741628745"/>
+                <p14:modId xmlns:p14="http://schemas.microsoft.com/office/powerpoint/2010/main" val="96999939"/>
               </p:ext>
             </p:extLst>
           </p:nvPr>
@@ -5688,17 +5712,10 @@
                     <a:lstStyle/>
                     <a:p>
                       <a:pPr algn="ctr"/>
-                      <a:endParaRPr lang="en-CA" dirty="0"/>
-                    </a:p>
-                  </a:txBody>
-                  <a:tcPr/>
-                </a:tc>
-                <a:tc>
-                  <a:txBody>
-                    <a:bodyPr/>
-                    <a:lstStyle/>
-                    <a:p>
-                      <a:endParaRPr lang="en-CA"/>
+                      <a:r>
+                        <a:rPr lang="en-CA" dirty="0"/>
+                        <a:t>Battery</a:t>
+                      </a:r>
                     </a:p>
                   </a:txBody>
                   <a:tcPr/>
@@ -5711,7 +5728,21 @@
                       <a:pPr algn="ctr"/>
                       <a:r>
                         <a:rPr lang="en-CA" dirty="0"/>
-                        <a:t>72</a:t>
+                        <a:t>1</a:t>
+                      </a:r>
+                    </a:p>
+                  </a:txBody>
+                  <a:tcPr/>
+                </a:tc>
+                <a:tc>
+                  <a:txBody>
+                    <a:bodyPr/>
+                    <a:lstStyle/>
+                    <a:p>
+                      <a:pPr algn="ctr"/>
+                      <a:r>
+                        <a:rPr lang="en-CA" dirty="0"/>
+                        <a:t>30</a:t>
                       </a:r>
                     </a:p>
                   </a:txBody>
@@ -5727,10 +5758,128 @@
           </a:graphicData>
         </a:graphic>
       </p:graphicFrame>
+      <p:sp>
+        <p:nvSpPr>
+          <p:cNvPr id="3" name="TextBox 2">
+            <a:extLst>
+              <a:ext uri="{FF2B5EF4-FFF2-40B4-BE49-F238E27FC236}">
+                <a16:creationId xmlns:a16="http://schemas.microsoft.com/office/drawing/2014/main" id="{F33F7695-69E5-4A50-A901-606213160E88}"/>
+              </a:ext>
+            </a:extLst>
+          </p:cNvPr>
+          <p:cNvSpPr txBox="1"/>
+          <p:nvPr/>
+        </p:nvSpPr>
+        <p:spPr>
+          <a:xfrm>
+            <a:off x="9807804" y="5231877"/>
+            <a:ext cx="3091992" cy="523220"/>
+          </a:xfrm>
+          <a:prstGeom prst="rect">
+            <a:avLst/>
+          </a:prstGeom>
+          <a:noFill/>
+        </p:spPr>
+        <p:txBody>
+          <a:bodyPr wrap="square" rtlCol="0">
+            <a:spAutoFit/>
+          </a:bodyPr>
+          <a:lstStyle/>
+          <a:p>
+            <a:r>
+              <a:rPr lang="en-CA" sz="2800" dirty="0"/>
+              <a:t>TOTAL: 102</a:t>
+            </a:r>
+          </a:p>
+        </p:txBody>
+      </p:sp>
     </p:spTree>
     <p:extLst>
       <p:ext uri="{BB962C8B-B14F-4D97-AF65-F5344CB8AC3E}">
         <p14:creationId xmlns:p14="http://schemas.microsoft.com/office/powerpoint/2010/main" val="3021129812"/>
+      </p:ext>
+    </p:extLst>
+  </p:cSld>
+  <p:clrMapOvr>
+    <a:masterClrMapping/>
+  </p:clrMapOvr>
+</p:sld>
+</file>
+
+<file path=ppt/slides/slide6.xml><?xml version="1.0" encoding="utf-8"?>
+<p:sld xmlns:a="http://schemas.openxmlformats.org/drawingml/2006/main" xmlns:r="http://schemas.openxmlformats.org/officeDocument/2006/relationships" xmlns:p="http://schemas.openxmlformats.org/presentationml/2006/main">
+  <p:cSld>
+    <p:spTree>
+      <p:nvGrpSpPr>
+        <p:cNvPr id="1" name=""/>
+        <p:cNvGrpSpPr/>
+        <p:nvPr/>
+      </p:nvGrpSpPr>
+      <p:grpSpPr>
+        <a:xfrm>
+          <a:off x="0" y="0"/>
+          <a:ext cx="0" cy="0"/>
+          <a:chOff x="0" y="0"/>
+          <a:chExt cx="0" cy="0"/>
+        </a:xfrm>
+      </p:grpSpPr>
+      <p:sp>
+        <p:nvSpPr>
+          <p:cNvPr id="2" name="Title 1">
+            <a:extLst>
+              <a:ext uri="{FF2B5EF4-FFF2-40B4-BE49-F238E27FC236}">
+                <a16:creationId xmlns:a16="http://schemas.microsoft.com/office/drawing/2014/main" id="{29C0DEC7-62A0-464A-8E29-9B78948187C0}"/>
+              </a:ext>
+            </a:extLst>
+          </p:cNvPr>
+          <p:cNvSpPr>
+            <a:spLocks noGrp="1"/>
+          </p:cNvSpPr>
+          <p:nvPr>
+            <p:ph type="title"/>
+          </p:nvPr>
+        </p:nvSpPr>
+        <p:spPr/>
+        <p:txBody>
+          <a:bodyPr/>
+          <a:lstStyle/>
+          <a:p>
+            <a:r>
+              <a:rPr lang="en-CA" dirty="0"/>
+              <a:t>Schedule &amp; Tasks</a:t>
+            </a:r>
+          </a:p>
+        </p:txBody>
+      </p:sp>
+      <p:sp>
+        <p:nvSpPr>
+          <p:cNvPr id="3" name="Content Placeholder 2">
+            <a:extLst>
+              <a:ext uri="{FF2B5EF4-FFF2-40B4-BE49-F238E27FC236}">
+                <a16:creationId xmlns:a16="http://schemas.microsoft.com/office/drawing/2014/main" id="{F091F144-FE35-412F-B517-1C2CE1FF5A04}"/>
+              </a:ext>
+            </a:extLst>
+          </p:cNvPr>
+          <p:cNvSpPr>
+            <a:spLocks noGrp="1"/>
+          </p:cNvSpPr>
+          <p:nvPr>
+            <p:ph idx="1"/>
+          </p:nvPr>
+        </p:nvSpPr>
+        <p:spPr/>
+        <p:txBody>
+          <a:bodyPr/>
+          <a:lstStyle/>
+          <a:p>
+            <a:endParaRPr lang="en-CA"/>
+          </a:p>
+        </p:txBody>
+      </p:sp>
+    </p:spTree>
+    <p:extLst>
+      <p:ext uri="{BB962C8B-B14F-4D97-AF65-F5344CB8AC3E}">
+        <p14:creationId xmlns:p14="http://schemas.microsoft.com/office/powerpoint/2010/main" val="1788322995"/>
       </p:ext>
     </p:extLst>
   </p:cSld>

</xml_diff>

<commit_message>
added System Module slides and updated Functional Specification slide
</commit_message>
<xml_diff>
--- a/Documents/project_proposal.pptx
+++ b/Documents/project_proposal.pptx
@@ -9,9 +9,11 @@
     <p:sldId id="257" r:id="rId3"/>
     <p:sldId id="258" r:id="rId4"/>
     <p:sldId id="259" r:id="rId5"/>
-    <p:sldId id="262" r:id="rId6"/>
-    <p:sldId id="260" r:id="rId7"/>
-    <p:sldId id="261" r:id="rId8"/>
+    <p:sldId id="263" r:id="rId6"/>
+    <p:sldId id="264" r:id="rId7"/>
+    <p:sldId id="262" r:id="rId8"/>
+    <p:sldId id="260" r:id="rId9"/>
+    <p:sldId id="261" r:id="rId10"/>
   </p:sldIdLst>
   <p:sldSz cx="12192000" cy="6858000"/>
   <p:notesSz cx="6858000" cy="9144000"/>
@@ -121,13 +123,115 @@
 <file path=ppt/revisionInfo.xml><?xml version="1.0" encoding="utf-8"?>
 <p1510:revInfo xmlns:a="http://schemas.openxmlformats.org/drawingml/2006/main" xmlns:r="http://schemas.openxmlformats.org/officeDocument/2006/relationships" xmlns:p1510="http://schemas.microsoft.com/office/powerpoint/2015/10/main">
   <p1510:revLst>
-    <p1510:client id="{17C5753B-AC8D-4301-833B-318A7E610C0A}" v="263" dt="2018-09-17T23:58:27.809"/>
+    <p1510:client id="{B8E70F94-FB69-4B12-8876-449EF236D06D}" v="582" dt="2018-09-21T14:49:14.509"/>
   </p1510:revLst>
 </p1510:revInfo>
 </file>
 
 <file path=ppt/changesInfos/changesInfo1.xml><?xml version="1.0" encoding="utf-8"?>
 <pc:chgInfo xmlns:a="http://schemas.openxmlformats.org/drawingml/2006/main" xmlns:r="http://schemas.openxmlformats.org/officeDocument/2006/relationships" xmlns:ac="http://schemas.microsoft.com/office/drawing/2013/main/command" xmlns:pc="http://schemas.microsoft.com/office/powerpoint/2013/main/command">
+  <pc:docChgLst>
+    <pc:chgData name="Horia Petre" userId="a27f21c445ea404d" providerId="LiveId" clId="{B8E70F94-FB69-4B12-8876-449EF236D06D}"/>
+    <pc:docChg chg="custSel addSld modSld">
+      <pc:chgData name="Horia Petre" userId="a27f21c445ea404d" providerId="LiveId" clId="{B8E70F94-FB69-4B12-8876-449EF236D06D}" dt="2018-09-21T14:49:14.509" v="580" actId="20577"/>
+      <pc:docMkLst>
+        <pc:docMk/>
+      </pc:docMkLst>
+      <pc:sldChg chg="modSp">
+        <pc:chgData name="Horia Petre" userId="a27f21c445ea404d" providerId="LiveId" clId="{B8E70F94-FB69-4B12-8876-449EF236D06D}" dt="2018-09-21T14:45:24.744" v="413" actId="20577"/>
+        <pc:sldMkLst>
+          <pc:docMk/>
+          <pc:sldMk cId="676945300" sldId="259"/>
+        </pc:sldMkLst>
+        <pc:spChg chg="mod">
+          <ac:chgData name="Horia Petre" userId="a27f21c445ea404d" providerId="LiveId" clId="{B8E70F94-FB69-4B12-8876-449EF236D06D}" dt="2018-09-21T14:43:06.836" v="373" actId="20577"/>
+          <ac:spMkLst>
+            <pc:docMk/>
+            <pc:sldMk cId="676945300" sldId="259"/>
+            <ac:spMk id="5" creationId="{90226D52-E99F-4271-BD2A-C879D4500446}"/>
+          </ac:spMkLst>
+        </pc:spChg>
+        <pc:spChg chg="mod">
+          <ac:chgData name="Horia Petre" userId="a27f21c445ea404d" providerId="LiveId" clId="{B8E70F94-FB69-4B12-8876-449EF236D06D}" dt="2018-09-21T14:45:24.744" v="413" actId="20577"/>
+          <ac:spMkLst>
+            <pc:docMk/>
+            <pc:sldMk cId="676945300" sldId="259"/>
+            <ac:spMk id="8" creationId="{9807F76D-6FEE-42A1-871D-24E624CAF26F}"/>
+          </ac:spMkLst>
+        </pc:spChg>
+        <pc:cxnChg chg="mod">
+          <ac:chgData name="Horia Petre" userId="a27f21c445ea404d" providerId="LiveId" clId="{B8E70F94-FB69-4B12-8876-449EF236D06D}" dt="2018-09-21T14:45:15.115" v="397" actId="14100"/>
+          <ac:cxnSpMkLst>
+            <pc:docMk/>
+            <pc:sldMk cId="676945300" sldId="259"/>
+            <ac:cxnSpMk id="11" creationId="{8D7C6DA0-8404-4401-AAC4-1D78B17362C0}"/>
+          </ac:cxnSpMkLst>
+        </pc:cxnChg>
+        <pc:cxnChg chg="mod">
+          <ac:chgData name="Horia Petre" userId="a27f21c445ea404d" providerId="LiveId" clId="{B8E70F94-FB69-4B12-8876-449EF236D06D}" dt="2018-09-21T14:39:06.557" v="305" actId="14100"/>
+          <ac:cxnSpMkLst>
+            <pc:docMk/>
+            <pc:sldMk cId="676945300" sldId="259"/>
+            <ac:cxnSpMk id="12" creationId="{2302ADBE-4231-4269-B931-675ECDE6A838}"/>
+          </ac:cxnSpMkLst>
+        </pc:cxnChg>
+        <pc:cxnChg chg="mod">
+          <ac:chgData name="Horia Petre" userId="a27f21c445ea404d" providerId="LiveId" clId="{B8E70F94-FB69-4B12-8876-449EF236D06D}" dt="2018-09-21T14:39:11.274" v="306" actId="14100"/>
+          <ac:cxnSpMkLst>
+            <pc:docMk/>
+            <pc:sldMk cId="676945300" sldId="259"/>
+            <ac:cxnSpMk id="13" creationId="{ABFB6E30-800B-4BB0-A7D7-5C1D49A53429}"/>
+          </ac:cxnSpMkLst>
+        </pc:cxnChg>
+        <pc:cxnChg chg="mod">
+          <ac:chgData name="Horia Petre" userId="a27f21c445ea404d" providerId="LiveId" clId="{B8E70F94-FB69-4B12-8876-449EF236D06D}" dt="2018-09-21T14:45:10.688" v="396" actId="14100"/>
+          <ac:cxnSpMkLst>
+            <pc:docMk/>
+            <pc:sldMk cId="676945300" sldId="259"/>
+            <ac:cxnSpMk id="15" creationId="{CE2D918A-6990-4A2D-8F53-3862DED4401A}"/>
+          </ac:cxnSpMkLst>
+        </pc:cxnChg>
+      </pc:sldChg>
+      <pc:sldChg chg="modSp add">
+        <pc:chgData name="Horia Petre" userId="a27f21c445ea404d" providerId="LiveId" clId="{B8E70F94-FB69-4B12-8876-449EF236D06D}" dt="2018-09-21T14:49:14.509" v="580" actId="20577"/>
+        <pc:sldMkLst>
+          <pc:docMk/>
+          <pc:sldMk cId="3913583972" sldId="263"/>
+        </pc:sldMkLst>
+        <pc:spChg chg="mod">
+          <ac:chgData name="Horia Petre" userId="a27f21c445ea404d" providerId="LiveId" clId="{B8E70F94-FB69-4B12-8876-449EF236D06D}" dt="2018-09-21T14:32:42.654" v="14" actId="20577"/>
+          <ac:spMkLst>
+            <pc:docMk/>
+            <pc:sldMk cId="3913583972" sldId="263"/>
+            <ac:spMk id="2" creationId="{368D1E17-C753-4445-BC53-318622695B1C}"/>
+          </ac:spMkLst>
+        </pc:spChg>
+        <pc:spChg chg="mod">
+          <ac:chgData name="Horia Petre" userId="a27f21c445ea404d" providerId="LiveId" clId="{B8E70F94-FB69-4B12-8876-449EF236D06D}" dt="2018-09-21T14:49:14.509" v="580" actId="20577"/>
+          <ac:spMkLst>
+            <pc:docMk/>
+            <pc:sldMk cId="3913583972" sldId="263"/>
+            <ac:spMk id="3" creationId="{49939CF4-6CE2-4FE5-B4C5-1F42133A5AFD}"/>
+          </ac:spMkLst>
+        </pc:spChg>
+      </pc:sldChg>
+      <pc:sldChg chg="modSp">
+        <pc:chgData name="Horia Petre" userId="a27f21c445ea404d" providerId="LiveId" clId="{B8E70F94-FB69-4B12-8876-449EF236D06D}" dt="2018-09-21T14:47:43.537" v="552" actId="20577"/>
+        <pc:sldMkLst>
+          <pc:docMk/>
+          <pc:sldMk cId="1096990955" sldId="264"/>
+        </pc:sldMkLst>
+        <pc:spChg chg="mod">
+          <ac:chgData name="Horia Petre" userId="a27f21c445ea404d" providerId="LiveId" clId="{B8E70F94-FB69-4B12-8876-449EF236D06D}" dt="2018-09-21T14:47:43.537" v="552" actId="20577"/>
+          <ac:spMkLst>
+            <pc:docMk/>
+            <pc:sldMk cId="1096990955" sldId="264"/>
+            <ac:spMk id="3" creationId="{49939CF4-6CE2-4FE5-B4C5-1F42133A5AFD}"/>
+          </ac:spMkLst>
+        </pc:spChg>
+      </pc:sldChg>
+    </pc:docChg>
+  </pc:docChgLst>
   <pc:docChgLst>
     <pc:chgData name="Horia Petre" userId="a27f21c445ea404d" providerId="LiveId" clId="{6D9A2202-AD4B-4406-BC56-4D5AD439A86A}"/>
     <pc:docChg chg="undo custSel mod addSld delSld modSld sldOrd modMainMaster">
@@ -729,7 +833,7 @@
           <a:p>
             <a:fld id="{03C4E9D7-646C-496D-887C-29F418E352D9}" type="datetimeFigureOut">
               <a:rPr lang="en-CA" smtClean="0"/>
-              <a:t>2018-09-17</a:t>
+              <a:t>2018-09-21</a:t>
             </a:fld>
             <a:endParaRPr lang="en-CA"/>
           </a:p>
@@ -929,7 +1033,7 @@
           <a:p>
             <a:fld id="{03C4E9D7-646C-496D-887C-29F418E352D9}" type="datetimeFigureOut">
               <a:rPr lang="en-CA" smtClean="0"/>
-              <a:t>2018-09-17</a:t>
+              <a:t>2018-09-21</a:t>
             </a:fld>
             <a:endParaRPr lang="en-CA"/>
           </a:p>
@@ -1139,7 +1243,7 @@
           <a:p>
             <a:fld id="{03C4E9D7-646C-496D-887C-29F418E352D9}" type="datetimeFigureOut">
               <a:rPr lang="en-CA" smtClean="0"/>
-              <a:t>2018-09-17</a:t>
+              <a:t>2018-09-21</a:t>
             </a:fld>
             <a:endParaRPr lang="en-CA"/>
           </a:p>
@@ -1339,7 +1443,7 @@
           <a:p>
             <a:fld id="{03C4E9D7-646C-496D-887C-29F418E352D9}" type="datetimeFigureOut">
               <a:rPr lang="en-CA" smtClean="0"/>
-              <a:t>2018-09-17</a:t>
+              <a:t>2018-09-21</a:t>
             </a:fld>
             <a:endParaRPr lang="en-CA"/>
           </a:p>
@@ -1615,7 +1719,7 @@
           <a:p>
             <a:fld id="{03C4E9D7-646C-496D-887C-29F418E352D9}" type="datetimeFigureOut">
               <a:rPr lang="en-CA" smtClean="0"/>
-              <a:t>2018-09-17</a:t>
+              <a:t>2018-09-21</a:t>
             </a:fld>
             <a:endParaRPr lang="en-CA"/>
           </a:p>
@@ -1883,7 +1987,7 @@
           <a:p>
             <a:fld id="{03C4E9D7-646C-496D-887C-29F418E352D9}" type="datetimeFigureOut">
               <a:rPr lang="en-CA" smtClean="0"/>
-              <a:t>2018-09-17</a:t>
+              <a:t>2018-09-21</a:t>
             </a:fld>
             <a:endParaRPr lang="en-CA"/>
           </a:p>
@@ -2298,7 +2402,7 @@
           <a:p>
             <a:fld id="{03C4E9D7-646C-496D-887C-29F418E352D9}" type="datetimeFigureOut">
               <a:rPr lang="en-CA" smtClean="0"/>
-              <a:t>2018-09-17</a:t>
+              <a:t>2018-09-21</a:t>
             </a:fld>
             <a:endParaRPr lang="en-CA"/>
           </a:p>
@@ -2440,7 +2544,7 @@
           <a:p>
             <a:fld id="{03C4E9D7-646C-496D-887C-29F418E352D9}" type="datetimeFigureOut">
               <a:rPr lang="en-CA" smtClean="0"/>
-              <a:t>2018-09-17</a:t>
+              <a:t>2018-09-21</a:t>
             </a:fld>
             <a:endParaRPr lang="en-CA"/>
           </a:p>
@@ -2553,7 +2657,7 @@
           <a:p>
             <a:fld id="{03C4E9D7-646C-496D-887C-29F418E352D9}" type="datetimeFigureOut">
               <a:rPr lang="en-CA" smtClean="0"/>
-              <a:t>2018-09-17</a:t>
+              <a:t>2018-09-21</a:t>
             </a:fld>
             <a:endParaRPr lang="en-CA"/>
           </a:p>
@@ -2866,7 +2970,7 @@
           <a:p>
             <a:fld id="{03C4E9D7-646C-496D-887C-29F418E352D9}" type="datetimeFigureOut">
               <a:rPr lang="en-CA" smtClean="0"/>
-              <a:t>2018-09-17</a:t>
+              <a:t>2018-09-21</a:t>
             </a:fld>
             <a:endParaRPr lang="en-CA"/>
           </a:p>
@@ -3155,7 +3259,7 @@
           <a:p>
             <a:fld id="{03C4E9D7-646C-496D-887C-29F418E352D9}" type="datetimeFigureOut">
               <a:rPr lang="en-CA" smtClean="0"/>
-              <a:t>2018-09-17</a:t>
+              <a:t>2018-09-21</a:t>
             </a:fld>
             <a:endParaRPr lang="en-CA"/>
           </a:p>
@@ -3398,7 +3502,7 @@
           <a:p>
             <a:fld id="{03C4E9D7-646C-496D-887C-29F418E352D9}" type="datetimeFigureOut">
               <a:rPr lang="en-CA" smtClean="0"/>
-              <a:t>2018-09-17</a:t>
+              <a:t>2018-09-21</a:t>
             </a:fld>
             <a:endParaRPr lang="en-CA"/>
           </a:p>
@@ -4642,8 +4746,8 @@
         </p:nvSpPr>
         <p:spPr>
           <a:xfrm>
-            <a:off x="6688528" y="2807249"/>
-            <a:ext cx="1705937" cy="736234"/>
+            <a:off x="6339292" y="1503593"/>
+            <a:ext cx="2638901" cy="2039890"/>
           </a:xfrm>
           <a:prstGeom prst="rect">
             <a:avLst/>
@@ -4676,6 +4780,39 @@
             <a:r>
               <a:rPr lang="en-CA" sz="1600" dirty="0"/>
               <a:t>ARM Cortex M0+</a:t>
+            </a:r>
+          </a:p>
+          <a:p>
+            <a:pPr algn="ctr"/>
+            <a:endParaRPr lang="en-CA" sz="1600" dirty="0"/>
+          </a:p>
+          <a:p>
+            <a:pPr algn="ctr"/>
+            <a:r>
+              <a:rPr lang="en-CA" sz="1600" dirty="0"/>
+              <a:t>Balance module</a:t>
+            </a:r>
+          </a:p>
+          <a:p>
+            <a:pPr algn="ctr"/>
+            <a:r>
+              <a:rPr lang="en-CA" sz="1600" dirty="0"/>
+              <a:t>Obstacle </a:t>
+            </a:r>
+            <a:r>
+              <a:rPr lang="en-CA" sz="1600" dirty="0" err="1"/>
+              <a:t>dection</a:t>
+            </a:r>
+            <a:r>
+              <a:rPr lang="en-CA" sz="1600" dirty="0"/>
+              <a:t> module</a:t>
+            </a:r>
+          </a:p>
+          <a:p>
+            <a:pPr algn="ctr"/>
+            <a:r>
+              <a:rPr lang="en-CA" sz="1600" dirty="0"/>
+              <a:t>Motor Drive module</a:t>
             </a:r>
           </a:p>
         </p:txBody>
@@ -4804,8 +4941,8 @@
         </p:nvSpPr>
         <p:spPr>
           <a:xfrm>
-            <a:off x="4431097" y="2829926"/>
-            <a:ext cx="1206291" cy="2039890"/>
+            <a:off x="4013123" y="2829926"/>
+            <a:ext cx="1624266" cy="2039890"/>
           </a:xfrm>
           <a:prstGeom prst="rect">
             <a:avLst/>
@@ -4840,6 +4977,24 @@
             <a:r>
               <a:rPr lang="en-CA" sz="1600" dirty="0"/>
               <a:t>Sensors</a:t>
+            </a:r>
+          </a:p>
+          <a:p>
+            <a:pPr algn="ctr"/>
+            <a:endParaRPr lang="en-CA" sz="1600" dirty="0"/>
+          </a:p>
+          <a:p>
+            <a:pPr algn="ctr"/>
+            <a:r>
+              <a:rPr lang="en-CA" sz="1600" dirty="0"/>
+              <a:t>Internal to ARM</a:t>
+            </a:r>
+          </a:p>
+          <a:p>
+            <a:pPr algn="ctr"/>
+            <a:r>
+              <a:rPr lang="en-CA" sz="1600" dirty="0"/>
+              <a:t>External to ARM</a:t>
             </a:r>
           </a:p>
         </p:txBody>
@@ -4916,7 +5071,7 @@
         <p:spPr>
           <a:xfrm>
             <a:off x="3374903" y="3198043"/>
-            <a:ext cx="1056194" cy="0"/>
+            <a:ext cx="638220" cy="0"/>
           </a:xfrm>
           <a:prstGeom prst="straightConnector1">
             <a:avLst/>
@@ -4949,13 +5104,15 @@
               </a:ext>
             </a:extLst>
           </p:cNvPr>
-          <p:cNvCxnSpPr/>
+          <p:cNvCxnSpPr>
+            <a:cxnSpLocks/>
+          </p:cNvCxnSpPr>
           <p:nvPr/>
         </p:nvCxnSpPr>
         <p:spPr>
           <a:xfrm>
             <a:off x="5637388" y="3175366"/>
-            <a:ext cx="1056194" cy="0"/>
+            <a:ext cx="701904" cy="0"/>
           </a:xfrm>
           <a:prstGeom prst="straightConnector1">
             <a:avLst/>
@@ -4988,13 +5145,15 @@
               </a:ext>
             </a:extLst>
           </p:cNvPr>
-          <p:cNvCxnSpPr/>
+          <p:cNvCxnSpPr>
+            <a:cxnSpLocks/>
+          </p:cNvCxnSpPr>
           <p:nvPr/>
         </p:nvCxnSpPr>
         <p:spPr>
           <a:xfrm>
-            <a:off x="8394465" y="3175366"/>
-            <a:ext cx="1056194" cy="0"/>
+            <a:off x="8978193" y="3175366"/>
+            <a:ext cx="472466" cy="0"/>
           </a:xfrm>
           <a:prstGeom prst="straightConnector1">
             <a:avLst/>
@@ -5035,7 +5194,7 @@
         <p:spPr>
           <a:xfrm>
             <a:off x="3374902" y="4509502"/>
-            <a:ext cx="1056194" cy="0"/>
+            <a:ext cx="638221" cy="0"/>
           </a:xfrm>
           <a:prstGeom prst="straightConnector1">
             <a:avLst/>
@@ -5394,6 +5553,270 @@
           <a:chExt cx="0" cy="0"/>
         </a:xfrm>
       </p:grpSpPr>
+      <p:sp>
+        <p:nvSpPr>
+          <p:cNvPr id="2" name="Title 1">
+            <a:extLst>
+              <a:ext uri="{FF2B5EF4-FFF2-40B4-BE49-F238E27FC236}">
+                <a16:creationId xmlns:a16="http://schemas.microsoft.com/office/drawing/2014/main" id="{368D1E17-C753-4445-BC53-318622695B1C}"/>
+              </a:ext>
+            </a:extLst>
+          </p:cNvPr>
+          <p:cNvSpPr>
+            <a:spLocks noGrp="1"/>
+          </p:cNvSpPr>
+          <p:nvPr>
+            <p:ph type="title"/>
+          </p:nvPr>
+        </p:nvSpPr>
+        <p:spPr/>
+        <p:txBody>
+          <a:bodyPr/>
+          <a:lstStyle/>
+          <a:p>
+            <a:r>
+              <a:rPr lang="en-CA" dirty="0"/>
+              <a:t>System modules</a:t>
+            </a:r>
+          </a:p>
+        </p:txBody>
+      </p:sp>
+      <p:sp>
+        <p:nvSpPr>
+          <p:cNvPr id="3" name="Content Placeholder 2">
+            <a:extLst>
+              <a:ext uri="{FF2B5EF4-FFF2-40B4-BE49-F238E27FC236}">
+                <a16:creationId xmlns:a16="http://schemas.microsoft.com/office/drawing/2014/main" id="{49939CF4-6CE2-4FE5-B4C5-1F42133A5AFD}"/>
+              </a:ext>
+            </a:extLst>
+          </p:cNvPr>
+          <p:cNvSpPr>
+            <a:spLocks noGrp="1"/>
+          </p:cNvSpPr>
+          <p:nvPr>
+            <p:ph idx="1"/>
+          </p:nvPr>
+        </p:nvSpPr>
+        <p:spPr/>
+        <p:txBody>
+          <a:bodyPr>
+            <a:normAutofit lnSpcReduction="10000"/>
+          </a:bodyPr>
+          <a:lstStyle/>
+          <a:p>
+            <a:r>
+              <a:rPr lang="en-CA" b="1" dirty="0"/>
+              <a:t>Balance module</a:t>
+            </a:r>
+            <a:r>
+              <a:rPr lang="en-CA" dirty="0"/>
+              <a:t> </a:t>
+            </a:r>
+          </a:p>
+          <a:p>
+            <a:pPr>
+              <a:buFont typeface="Wingdings" panose="05000000000000000000" pitchFamily="2" charset="2"/>
+              <a:buChar char="Ø"/>
+            </a:pPr>
+            <a:r>
+              <a:rPr lang="en-CA" dirty="0"/>
+              <a:t> Monitors and corrects the vertical balance of the robot. </a:t>
+            </a:r>
+          </a:p>
+          <a:p>
+            <a:pPr>
+              <a:buFont typeface="Wingdings" panose="05000000000000000000" pitchFamily="2" charset="2"/>
+              <a:buChar char="Ø"/>
+            </a:pPr>
+            <a:r>
+              <a:rPr lang="en-CA" dirty="0"/>
+              <a:t> Sends commands to the Motor Drive module. </a:t>
+            </a:r>
+          </a:p>
+          <a:p>
+            <a:pPr>
+              <a:buFont typeface="Wingdings" panose="05000000000000000000" pitchFamily="2" charset="2"/>
+              <a:buChar char="Ø"/>
+            </a:pPr>
+            <a:r>
+              <a:rPr lang="en-CA" dirty="0"/>
+              <a:t> Runs on the FRDM KL25Z.</a:t>
+            </a:r>
+          </a:p>
+          <a:p>
+            <a:endParaRPr lang="en-CA" dirty="0"/>
+          </a:p>
+          <a:p>
+            <a:r>
+              <a:rPr lang="en-CA" b="1" dirty="0"/>
+              <a:t>Obstacle detection module</a:t>
+            </a:r>
+          </a:p>
+          <a:p>
+            <a:pPr>
+              <a:buFont typeface="Wingdings" panose="05000000000000000000" pitchFamily="2" charset="2"/>
+              <a:buChar char="Ø"/>
+            </a:pPr>
+            <a:r>
+              <a:rPr lang="en-CA" dirty="0"/>
+              <a:t> Checks for obstacles in the robot’s path.</a:t>
+            </a:r>
+          </a:p>
+          <a:p>
+            <a:pPr>
+              <a:buFont typeface="Wingdings" panose="05000000000000000000" pitchFamily="2" charset="2"/>
+              <a:buChar char="Ø"/>
+            </a:pPr>
+            <a:r>
+              <a:rPr lang="en-CA" dirty="0"/>
+              <a:t> Sends commands to the Motor Drive module to stop moving the robot.</a:t>
+            </a:r>
+          </a:p>
+          <a:p>
+            <a:pPr>
+              <a:buFont typeface="Wingdings" panose="05000000000000000000" pitchFamily="2" charset="2"/>
+              <a:buChar char="Ø"/>
+            </a:pPr>
+            <a:endParaRPr lang="en-CA" dirty="0"/>
+          </a:p>
+        </p:txBody>
+      </p:sp>
+    </p:spTree>
+    <p:extLst>
+      <p:ext uri="{BB962C8B-B14F-4D97-AF65-F5344CB8AC3E}">
+        <p14:creationId xmlns:p14="http://schemas.microsoft.com/office/powerpoint/2010/main" val="3913583972"/>
+      </p:ext>
+    </p:extLst>
+  </p:cSld>
+  <p:clrMapOvr>
+    <a:masterClrMapping/>
+  </p:clrMapOvr>
+</p:sld>
+</file>
+
+<file path=ppt/slides/slide6.xml><?xml version="1.0" encoding="utf-8"?>
+<p:sld xmlns:a="http://schemas.openxmlformats.org/drawingml/2006/main" xmlns:r="http://schemas.openxmlformats.org/officeDocument/2006/relationships" xmlns:p="http://schemas.openxmlformats.org/presentationml/2006/main">
+  <p:cSld>
+    <p:spTree>
+      <p:nvGrpSpPr>
+        <p:cNvPr id="1" name=""/>
+        <p:cNvGrpSpPr/>
+        <p:nvPr/>
+      </p:nvGrpSpPr>
+      <p:grpSpPr>
+        <a:xfrm>
+          <a:off x="0" y="0"/>
+          <a:ext cx="0" cy="0"/>
+          <a:chOff x="0" y="0"/>
+          <a:chExt cx="0" cy="0"/>
+        </a:xfrm>
+      </p:grpSpPr>
+      <p:sp>
+        <p:nvSpPr>
+          <p:cNvPr id="2" name="Title 1">
+            <a:extLst>
+              <a:ext uri="{FF2B5EF4-FFF2-40B4-BE49-F238E27FC236}">
+                <a16:creationId xmlns:a16="http://schemas.microsoft.com/office/drawing/2014/main" id="{368D1E17-C753-4445-BC53-318622695B1C}"/>
+              </a:ext>
+            </a:extLst>
+          </p:cNvPr>
+          <p:cNvSpPr>
+            <a:spLocks noGrp="1"/>
+          </p:cNvSpPr>
+          <p:nvPr>
+            <p:ph type="title"/>
+          </p:nvPr>
+        </p:nvSpPr>
+        <p:spPr/>
+        <p:txBody>
+          <a:bodyPr/>
+          <a:lstStyle/>
+          <a:p>
+            <a:r>
+              <a:rPr lang="en-CA" dirty="0"/>
+              <a:t>System modules</a:t>
+            </a:r>
+          </a:p>
+        </p:txBody>
+      </p:sp>
+      <p:sp>
+        <p:nvSpPr>
+          <p:cNvPr id="3" name="Content Placeholder 2">
+            <a:extLst>
+              <a:ext uri="{FF2B5EF4-FFF2-40B4-BE49-F238E27FC236}">
+                <a16:creationId xmlns:a16="http://schemas.microsoft.com/office/drawing/2014/main" id="{49939CF4-6CE2-4FE5-B4C5-1F42133A5AFD}"/>
+              </a:ext>
+            </a:extLst>
+          </p:cNvPr>
+          <p:cNvSpPr>
+            <a:spLocks noGrp="1"/>
+          </p:cNvSpPr>
+          <p:nvPr>
+            <p:ph idx="1"/>
+          </p:nvPr>
+        </p:nvSpPr>
+        <p:spPr/>
+        <p:txBody>
+          <a:bodyPr/>
+          <a:lstStyle/>
+          <a:p>
+            <a:r>
+              <a:rPr lang="en-CA" b="1" dirty="0"/>
+              <a:t>Motor Drive module</a:t>
+            </a:r>
+          </a:p>
+          <a:p>
+            <a:pPr>
+              <a:buFont typeface="Wingdings" panose="05000000000000000000" pitchFamily="2" charset="2"/>
+              <a:buChar char="Ø"/>
+            </a:pPr>
+            <a:r>
+              <a:rPr lang="en-CA" dirty="0"/>
+              <a:t> receives commands from all other modules</a:t>
+            </a:r>
+          </a:p>
+          <a:p>
+            <a:pPr>
+              <a:buFont typeface="Wingdings" panose="05000000000000000000" pitchFamily="2" charset="2"/>
+              <a:buChar char="Ø"/>
+            </a:pPr>
+            <a:r>
+              <a:rPr lang="en-CA" dirty="0"/>
+              <a:t> sends commands to the wheel motors</a:t>
+            </a:r>
+          </a:p>
+        </p:txBody>
+      </p:sp>
+    </p:spTree>
+    <p:extLst>
+      <p:ext uri="{BB962C8B-B14F-4D97-AF65-F5344CB8AC3E}">
+        <p14:creationId xmlns:p14="http://schemas.microsoft.com/office/powerpoint/2010/main" val="1096990955"/>
+      </p:ext>
+    </p:extLst>
+  </p:cSld>
+  <p:clrMapOvr>
+    <a:masterClrMapping/>
+  </p:clrMapOvr>
+</p:sld>
+</file>
+
+<file path=ppt/slides/slide7.xml><?xml version="1.0" encoding="utf-8"?>
+<p:sld xmlns:a="http://schemas.openxmlformats.org/drawingml/2006/main" xmlns:r="http://schemas.openxmlformats.org/officeDocument/2006/relationships" xmlns:p="http://schemas.openxmlformats.org/presentationml/2006/main">
+  <p:cSld>
+    <p:spTree>
+      <p:nvGrpSpPr>
+        <p:cNvPr id="1" name=""/>
+        <p:cNvGrpSpPr/>
+        <p:nvPr/>
+      </p:nvGrpSpPr>
+      <p:grpSpPr>
+        <a:xfrm>
+          <a:off x="0" y="0"/>
+          <a:ext cx="0" cy="0"/>
+          <a:chOff x="0" y="0"/>
+          <a:chExt cx="0" cy="0"/>
+        </a:xfrm>
+      </p:grpSpPr>
       <p:pic>
         <p:nvPicPr>
           <p:cNvPr id="4" name="Content Placeholder 3"/>
@@ -5654,7 +6077,7 @@
 </p:sld>
 </file>
 
-<file path=ppt/slides/slide6.xml><?xml version="1.0" encoding="utf-8"?>
+<file path=ppt/slides/slide8.xml><?xml version="1.0" encoding="utf-8"?>
 <p:sld xmlns:a="http://schemas.openxmlformats.org/drawingml/2006/main" xmlns:r="http://schemas.openxmlformats.org/officeDocument/2006/relationships" xmlns:p="http://schemas.openxmlformats.org/presentationml/2006/main">
   <p:cSld>
     <p:spTree>
@@ -6099,7 +6522,7 @@
 </p:sld>
 </file>
 
-<file path=ppt/slides/slide7.xml><?xml version="1.0" encoding="utf-8"?>
+<file path=ppt/slides/slide9.xml><?xml version="1.0" encoding="utf-8"?>
 <p:sld xmlns:a="http://schemas.openxmlformats.org/drawingml/2006/main" xmlns:r="http://schemas.openxmlformats.org/officeDocument/2006/relationships" xmlns:p="http://schemas.openxmlformats.org/presentationml/2006/main">
   <p:cSld>
     <p:spTree>

</xml_diff>

<commit_message>
added student ID #
</commit_message>
<xml_diff>
--- a/Documents/project_proposal.pptx
+++ b/Documents/project_proposal.pptx
@@ -123,7 +123,7 @@
 <file path=ppt/revisionInfo.xml><?xml version="1.0" encoding="utf-8"?>
 <p1510:revInfo xmlns:a="http://schemas.openxmlformats.org/drawingml/2006/main" xmlns:r="http://schemas.openxmlformats.org/officeDocument/2006/relationships" xmlns:p1510="http://schemas.microsoft.com/office/powerpoint/2015/10/main">
   <p1510:revLst>
-    <p1510:client id="{B8E70F94-FB69-4B12-8876-449EF236D06D}" v="582" dt="2018-09-21T14:49:14.509"/>
+    <p1510:client id="{B8E70F94-FB69-4B12-8876-449EF236D06D}" v="629" dt="2018-09-21T15:24:09.555"/>
   </p1510:revLst>
 </p1510:revInfo>
 </file>
@@ -133,10 +133,25 @@
   <pc:docChgLst>
     <pc:chgData name="Horia Petre" userId="a27f21c445ea404d" providerId="LiveId" clId="{B8E70F94-FB69-4B12-8876-449EF236D06D}"/>
     <pc:docChg chg="custSel addSld modSld">
-      <pc:chgData name="Horia Petre" userId="a27f21c445ea404d" providerId="LiveId" clId="{B8E70F94-FB69-4B12-8876-449EF236D06D}" dt="2018-09-21T14:49:14.509" v="580" actId="20577"/>
+      <pc:chgData name="Horia Petre" userId="a27f21c445ea404d" providerId="LiveId" clId="{B8E70F94-FB69-4B12-8876-449EF236D06D}" dt="2018-09-21T15:24:09.555" v="627" actId="120"/>
       <pc:docMkLst>
         <pc:docMk/>
       </pc:docMkLst>
+      <pc:sldChg chg="modSp">
+        <pc:chgData name="Horia Petre" userId="a27f21c445ea404d" providerId="LiveId" clId="{B8E70F94-FB69-4B12-8876-449EF236D06D}" dt="2018-09-21T15:24:09.555" v="627" actId="120"/>
+        <pc:sldMkLst>
+          <pc:docMk/>
+          <pc:sldMk cId="3592037779" sldId="256"/>
+        </pc:sldMkLst>
+        <pc:spChg chg="mod">
+          <ac:chgData name="Horia Petre" userId="a27f21c445ea404d" providerId="LiveId" clId="{B8E70F94-FB69-4B12-8876-449EF236D06D}" dt="2018-09-21T15:24:09.555" v="627" actId="120"/>
+          <ac:spMkLst>
+            <pc:docMk/>
+            <pc:sldMk cId="3592037779" sldId="256"/>
+            <ac:spMk id="3" creationId="{80E9098B-7452-4218-84FD-989A1398F66F}"/>
+          </ac:spMkLst>
+        </pc:spChg>
+      </pc:sldChg>
       <pc:sldChg chg="modSp">
         <pc:chgData name="Horia Petre" userId="a27f21c445ea404d" providerId="LiveId" clId="{B8E70F94-FB69-4B12-8876-449EF236D06D}" dt="2018-09-21T14:45:24.744" v="413" actId="20577"/>
         <pc:sldMkLst>
@@ -192,8 +207,23 @@
           </ac:cxnSpMkLst>
         </pc:cxnChg>
       </pc:sldChg>
+      <pc:sldChg chg="delSp">
+        <pc:chgData name="Horia Petre" userId="a27f21c445ea404d" providerId="LiveId" clId="{B8E70F94-FB69-4B12-8876-449EF236D06D}" dt="2018-09-21T15:14:11.090" v="620" actId="478"/>
+        <pc:sldMkLst>
+          <pc:docMk/>
+          <pc:sldMk cId="1788322995" sldId="261"/>
+        </pc:sldMkLst>
+        <pc:spChg chg="del">
+          <ac:chgData name="Horia Petre" userId="a27f21c445ea404d" providerId="LiveId" clId="{B8E70F94-FB69-4B12-8876-449EF236D06D}" dt="2018-09-21T15:14:11.090" v="620" actId="478"/>
+          <ac:spMkLst>
+            <pc:docMk/>
+            <pc:sldMk cId="1788322995" sldId="261"/>
+            <ac:spMk id="3" creationId="{F091F144-FE35-412F-B517-1C2CE1FF5A04}"/>
+          </ac:spMkLst>
+        </pc:spChg>
+      </pc:sldChg>
       <pc:sldChg chg="modSp add">
-        <pc:chgData name="Horia Petre" userId="a27f21c445ea404d" providerId="LiveId" clId="{B8E70F94-FB69-4B12-8876-449EF236D06D}" dt="2018-09-21T14:49:14.509" v="580" actId="20577"/>
+        <pc:chgData name="Horia Petre" userId="a27f21c445ea404d" providerId="LiveId" clId="{B8E70F94-FB69-4B12-8876-449EF236D06D}" dt="2018-09-21T14:58:12.336" v="583" actId="27636"/>
         <pc:sldMkLst>
           <pc:docMk/>
           <pc:sldMk cId="3913583972" sldId="263"/>
@@ -207,7 +237,7 @@
           </ac:spMkLst>
         </pc:spChg>
         <pc:spChg chg="mod">
-          <ac:chgData name="Horia Petre" userId="a27f21c445ea404d" providerId="LiveId" clId="{B8E70F94-FB69-4B12-8876-449EF236D06D}" dt="2018-09-21T14:49:14.509" v="580" actId="20577"/>
+          <ac:chgData name="Horia Petre" userId="a27f21c445ea404d" providerId="LiveId" clId="{B8E70F94-FB69-4B12-8876-449EF236D06D}" dt="2018-09-21T14:58:12.336" v="583" actId="27636"/>
           <ac:spMkLst>
             <pc:docMk/>
             <pc:sldMk cId="3913583972" sldId="263"/>
@@ -216,13 +246,13 @@
         </pc:spChg>
       </pc:sldChg>
       <pc:sldChg chg="modSp">
-        <pc:chgData name="Horia Petre" userId="a27f21c445ea404d" providerId="LiveId" clId="{B8E70F94-FB69-4B12-8876-449EF236D06D}" dt="2018-09-21T14:47:43.537" v="552" actId="20577"/>
+        <pc:chgData name="Horia Petre" userId="a27f21c445ea404d" providerId="LiveId" clId="{B8E70F94-FB69-4B12-8876-449EF236D06D}" dt="2018-09-21T15:05:15.492" v="619" actId="20577"/>
         <pc:sldMkLst>
           <pc:docMk/>
           <pc:sldMk cId="1096990955" sldId="264"/>
         </pc:sldMkLst>
         <pc:spChg chg="mod">
-          <ac:chgData name="Horia Petre" userId="a27f21c445ea404d" providerId="LiveId" clId="{B8E70F94-FB69-4B12-8876-449EF236D06D}" dt="2018-09-21T14:47:43.537" v="552" actId="20577"/>
+          <ac:chgData name="Horia Petre" userId="a27f21c445ea404d" providerId="LiveId" clId="{B8E70F94-FB69-4B12-8876-449EF236D06D}" dt="2018-09-21T15:05:15.492" v="619" actId="20577"/>
           <ac:spMkLst>
             <pc:docMk/>
             <pc:sldMk cId="1096990955" sldId="264"/>
@@ -4217,7 +4247,7 @@
             </a:r>
           </a:p>
           <a:p>
-            <a:pPr algn="l"/>
+            <a:pPr lvl="0" algn="l"/>
             <a:r>
               <a:rPr lang="en-US" sz="2000" dirty="0">
                 <a:solidFill>
@@ -4240,19 +4270,29 @@
                   <a:srgbClr val="FFFFFF"/>
                 </a:solidFill>
               </a:rPr>
-              <a:t> Sajid</a:t>
-            </a:r>
-          </a:p>
-          <a:p>
-            <a:pPr algn="l"/>
+              <a:t> Sajid (40075368)</a:t>
+            </a:r>
+            <a:endParaRPr lang="en-CA" sz="2000" dirty="0">
+              <a:solidFill>
+                <a:srgbClr val="FFFFFF"/>
+              </a:solidFill>
+            </a:endParaRPr>
+          </a:p>
+          <a:p>
+            <a:pPr lvl="0" algn="l"/>
             <a:r>
               <a:rPr lang="en-US" sz="2000" dirty="0">
                 <a:solidFill>
                   <a:srgbClr val="FFFFFF"/>
                 </a:solidFill>
               </a:rPr>
-              <a:t>Diego Mayorga</a:t>
-            </a:r>
+              <a:t>Diego Mayorga (40075927)</a:t>
+            </a:r>
+            <a:endParaRPr lang="en-CA" sz="2000" dirty="0">
+              <a:solidFill>
+                <a:srgbClr val="FFFFFF"/>
+              </a:solidFill>
+            </a:endParaRPr>
           </a:p>
           <a:p>
             <a:pPr algn="l"/>
@@ -5600,7 +5640,7 @@
         <p:spPr/>
         <p:txBody>
           <a:bodyPr>
-            <a:normAutofit lnSpcReduction="10000"/>
+            <a:normAutofit fontScale="92500"/>
           </a:bodyPr>
           <a:lstStyle/>
           <a:p>
@@ -5671,6 +5711,23 @@
               <a:rPr lang="en-CA" dirty="0"/>
               <a:t> Sends commands to the Motor Drive module to stop moving the robot.</a:t>
             </a:r>
+          </a:p>
+          <a:p>
+            <a:pPr>
+              <a:buFont typeface="Wingdings" panose="05000000000000000000" pitchFamily="2" charset="2"/>
+              <a:buChar char="Ø"/>
+            </a:pPr>
+            <a:r>
+              <a:rPr lang="en-CA" dirty="0"/>
+              <a:t>Runs on the FRDM KL25Z.</a:t>
+            </a:r>
+          </a:p>
+          <a:p>
+            <a:pPr>
+              <a:buFont typeface="Wingdings" panose="05000000000000000000" pitchFamily="2" charset="2"/>
+              <a:buChar char="Ø"/>
+            </a:pPr>
+            <a:endParaRPr lang="en-CA" dirty="0"/>
           </a:p>
           <a:p>
             <a:pPr>
@@ -5782,8 +5839,35 @@
             </a:pPr>
             <a:r>
               <a:rPr lang="en-CA" dirty="0"/>
-              <a:t> sends commands to the wheel motors</a:t>
-            </a:r>
+              <a:t> maintains a specific speed</a:t>
+            </a:r>
+          </a:p>
+          <a:p>
+            <a:pPr>
+              <a:buFont typeface="Wingdings" panose="05000000000000000000" pitchFamily="2" charset="2"/>
+              <a:buChar char="Ø"/>
+            </a:pPr>
+            <a:r>
+              <a:rPr lang="en-CA" dirty="0"/>
+              <a:t> sends commands to the wheel motors </a:t>
+            </a:r>
+          </a:p>
+          <a:p>
+            <a:pPr>
+              <a:buFont typeface="Wingdings" panose="05000000000000000000" pitchFamily="2" charset="2"/>
+              <a:buChar char="Ø"/>
+            </a:pPr>
+            <a:r>
+              <a:rPr lang="en-CA" dirty="0"/>
+              <a:t> Runs on the FRDM KL25Z.</a:t>
+            </a:r>
+          </a:p>
+          <a:p>
+            <a:pPr>
+              <a:buFont typeface="Wingdings" panose="05000000000000000000" pitchFamily="2" charset="2"/>
+              <a:buChar char="Ø"/>
+            </a:pPr>
+            <a:endParaRPr lang="en-CA" dirty="0"/>
           </a:p>
         </p:txBody>
       </p:sp>
@@ -6564,31 +6648,6 @@
               <a:rPr lang="en-CA" dirty="0"/>
               <a:t>Schedule &amp; Tasks</a:t>
             </a:r>
-          </a:p>
-        </p:txBody>
-      </p:sp>
-      <p:sp>
-        <p:nvSpPr>
-          <p:cNvPr id="3" name="Content Placeholder 2">
-            <a:extLst>
-              <a:ext uri="{FF2B5EF4-FFF2-40B4-BE49-F238E27FC236}">
-                <a16:creationId xmlns:a16="http://schemas.microsoft.com/office/drawing/2014/main" id="{F091F144-FE35-412F-B517-1C2CE1FF5A04}"/>
-              </a:ext>
-            </a:extLst>
-          </p:cNvPr>
-          <p:cNvSpPr>
-            <a:spLocks noGrp="1"/>
-          </p:cNvSpPr>
-          <p:nvPr>
-            <p:ph idx="1"/>
-          </p:nvPr>
-        </p:nvSpPr>
-        <p:spPr/>
-        <p:txBody>
-          <a:bodyPr/>
-          <a:lstStyle/>
-          <a:p>
-            <a:endParaRPr lang="en-CA"/>
           </a:p>
         </p:txBody>
       </p:sp>

</xml_diff>